<commit_message>
fixing error in oop slides
</commit_message>
<xml_diff>
--- a/python/presentations/learning_python/14_ceda-oop.pptx
+++ b/python/presentations/learning_python/14_ceda-oop.pptx
@@ -278,7 +278,7 @@
           <a:p>
             <a:fld id="{453E1398-088F-5240-8185-1E8BB797FB4C}" type="datetimeFigureOut">
               <a:rPr lang="en-GB" smtClean="0"/>
-              <a:t>17/11/2021</a:t>
+              <a:t>25/11/2021</a:t>
             </a:fld>
             <a:endParaRPr lang="en-GB"/>
           </a:p>
@@ -4919,7 +4919,7 @@
               <a:pPr>
                 <a:defRPr/>
               </a:pPr>
-              <a:t>17/11/2021</a:t>
+              <a:t>25/11/2021</a:t>
             </a:fld>
             <a:endParaRPr lang="en-GB"/>
           </a:p>
@@ -5156,7 +5156,7 @@
               <a:pPr>
                 <a:defRPr/>
               </a:pPr>
-              <a:t>17/11/2021</a:t>
+              <a:t>25/11/2021</a:t>
             </a:fld>
             <a:endParaRPr lang="en-GB"/>
           </a:p>
@@ -5802,7 +5802,7 @@
               <a:pPr>
                 <a:defRPr/>
               </a:pPr>
-              <a:t>17/11/2021</a:t>
+              <a:t>25/11/2021</a:t>
             </a:fld>
             <a:endParaRPr lang="en-GB"/>
           </a:p>
@@ -21787,7 +21787,7 @@
                 <a:latin typeface="Courier New" panose="02070309020205020404" pitchFamily="49" charset="0"/>
                 <a:cs typeface="Courier New" panose="02070309020205020404" pitchFamily="49" charset="0"/>
               </a:rPr>
-              <a:t> in range(0,31):</a:t>
+              <a:t> in range(1,32):</a:t>
             </a:r>
             <a:br>
               <a:rPr lang="en-US" altLang="en-US" sz="1600" dirty="0">

</xml_diff>

<commit_message>
adding triple quotes to docstring
</commit_message>
<xml_diff>
--- a/python/presentations/learning_python/14_ceda-oop.pptx
+++ b/python/presentations/learning_python/14_ceda-oop.pptx
@@ -278,7 +278,7 @@
           <a:p>
             <a:fld id="{453E1398-088F-5240-8185-1E8BB797FB4C}" type="datetimeFigureOut">
               <a:rPr lang="en-GB" smtClean="0"/>
-              <a:t>25/11/2021</a:t>
+              <a:t>26/11/2021</a:t>
             </a:fld>
             <a:endParaRPr lang="en-GB"/>
           </a:p>
@@ -4919,7 +4919,7 @@
               <a:pPr>
                 <a:defRPr/>
               </a:pPr>
-              <a:t>25/11/2021</a:t>
+              <a:t>26/11/2021</a:t>
             </a:fld>
             <a:endParaRPr lang="en-GB"/>
           </a:p>
@@ -5156,7 +5156,7 @@
               <a:pPr>
                 <a:defRPr/>
               </a:pPr>
-              <a:t>25/11/2021</a:t>
+              <a:t>26/11/2021</a:t>
             </a:fld>
             <a:endParaRPr lang="en-GB"/>
           </a:p>
@@ -5802,7 +5802,7 @@
               <a:pPr>
                 <a:defRPr/>
               </a:pPr>
-              <a:t>25/11/2021</a:t>
+              <a:t>26/11/2021</a:t>
             </a:fld>
             <a:endParaRPr lang="en-GB"/>
           </a:p>
@@ -11138,7 +11138,7 @@
                 <a:latin typeface="Courier New" pitchFamily="49" charset="0"/>
                 <a:cs typeface="Courier New" pitchFamily="49" charset="0"/>
               </a:rPr>
-              <a:t>	"A class above the rest"</a:t>
+              <a:t>	”””A class above the rest”””</a:t>
             </a:r>
           </a:p>
           <a:p>
@@ -15592,7 +15592,7 @@
                 <a:latin typeface="Courier New" pitchFamily="49" charset="0"/>
                 <a:cs typeface="Courier New" pitchFamily="49" charset="0"/>
               </a:rPr>
-              <a:t>	"A class above the rest"</a:t>
+              <a:t>	”””A class above the rest”””</a:t>
             </a:r>
           </a:p>
           <a:p>
@@ -16089,7 +16089,7 @@
                 <a:latin typeface="Courier New" pitchFamily="49" charset="0"/>
                 <a:cs typeface="Courier New" pitchFamily="49" charset="0"/>
               </a:rPr>
-              <a:t>	"A class above the rest"</a:t>
+              <a:t>	“””A class above the rest”””</a:t>
             </a:r>
           </a:p>
           <a:p>
@@ -16723,7 +16723,7 @@
                 <a:latin typeface="Courier New" pitchFamily="49" charset="0"/>
                 <a:cs typeface="Courier New" pitchFamily="49" charset="0"/>
               </a:rPr>
-              <a:t>	"A class above the rest"</a:t>
+              <a:t>	”””A class above the rest”””</a:t>
             </a:r>
           </a:p>
           <a:p>
@@ -17652,7 +17652,7 @@
                 <a:latin typeface="Courier New" pitchFamily="49" charset="0"/>
                 <a:cs typeface="Courier New" pitchFamily="49" charset="0"/>
               </a:rPr>
-              <a:t>	"A class above the rest"</a:t>
+              <a:t>	”””A class above the rest”””</a:t>
             </a:r>
           </a:p>
           <a:p>
@@ -18314,7 +18314,7 @@
                 <a:latin typeface="Courier New" pitchFamily="49" charset="0"/>
                 <a:cs typeface="Courier New" pitchFamily="49" charset="0"/>
               </a:rPr>
-              <a:t>	"A class above the rest"</a:t>
+              <a:t>	”””A class above the rest”””</a:t>
             </a:r>
           </a:p>
           <a:p>

</xml_diff>

<commit_message>
correcting value of 0K
</commit_message>
<xml_diff>
--- a/python/presentations/learning_python/14_ceda-oop.pptx
+++ b/python/presentations/learning_python/14_ceda-oop.pptx
@@ -27120,7 +27120,7 @@
                 <a:latin typeface="Courier New" panose="02070309020205020404" pitchFamily="49" charset="0"/>
                 <a:cs typeface="Courier New" panose="02070309020205020404" pitchFamily="49" charset="0"/>
               </a:rPr>
-              <a:t>        value += 272.15</a:t>
+              <a:t>        value += 273.15</a:t>
             </a:r>
             <a:br>
               <a:rPr lang="en-US" altLang="en-US" sz="1800" dirty="0">
@@ -29917,12 +29917,16 @@
               <a:buNone/>
             </a:pPr>
             <a:r>
-              <a:rPr lang="en-US" altLang="en-US" sz="1800" dirty="0">
-                <a:latin typeface="Courier New" panose="02070309020205020404" pitchFamily="49" charset="0"/>
-                <a:cs typeface="Courier New" panose="02070309020205020404" pitchFamily="49" charset="0"/>
-              </a:rPr>
-              <a:t>2021-05-01 277.15</a:t>
-            </a:r>
+              <a:rPr lang="en-US" altLang="en-US" sz="1800">
+                <a:latin typeface="Courier New" panose="02070309020205020404" pitchFamily="49" charset="0"/>
+                <a:cs typeface="Courier New" panose="02070309020205020404" pitchFamily="49" charset="0"/>
+              </a:rPr>
+              <a:t>2021-05-01 278.15</a:t>
+            </a:r>
+            <a:endParaRPr lang="en-US" altLang="en-US" sz="1800" dirty="0">
+              <a:latin typeface="Courier New" panose="02070309020205020404" pitchFamily="49" charset="0"/>
+              <a:cs typeface="Courier New" panose="02070309020205020404" pitchFamily="49" charset="0"/>
+            </a:endParaRPr>
           </a:p>
           <a:p>
             <a:pPr eaLnBrk="1" hangingPunct="1">

</xml_diff>